<commit_message>
updating motor driver file
</commit_message>
<xml_diff>
--- a/Motor driver.pptx
+++ b/Motor driver.pptx
@@ -19,6 +19,7 @@
     <p:sldId id="258" r:id="rId13"/>
     <p:sldId id="259" r:id="rId14"/>
     <p:sldId id="270" r:id="rId15"/>
+    <p:sldId id="271" r:id="rId16"/>
   </p:sldIdLst>
   <p:sldSz cx="12192000" cy="6858000"/>
   <p:notesSz cx="6858000" cy="9144000"/>
@@ -283,7 +284,7 @@
           <a:p>
             <a:fld id="{6BC3A7F1-B9CE-4598-BAFD-9A6560ED0FF1}" type="datetimeFigureOut">
               <a:rPr lang="en-US" smtClean="0"/>
-              <a:t>1/3/2020</a:t>
+              <a:t>1/31/2022</a:t>
             </a:fld>
             <a:endParaRPr lang="en-US"/>
           </a:p>
@@ -481,7 +482,7 @@
           <a:p>
             <a:fld id="{6BC3A7F1-B9CE-4598-BAFD-9A6560ED0FF1}" type="datetimeFigureOut">
               <a:rPr lang="en-US" smtClean="0"/>
-              <a:t>1/3/2020</a:t>
+              <a:t>1/31/2022</a:t>
             </a:fld>
             <a:endParaRPr lang="en-US"/>
           </a:p>
@@ -689,7 +690,7 @@
           <a:p>
             <a:fld id="{6BC3A7F1-B9CE-4598-BAFD-9A6560ED0FF1}" type="datetimeFigureOut">
               <a:rPr lang="en-US" smtClean="0"/>
-              <a:t>1/3/2020</a:t>
+              <a:t>1/31/2022</a:t>
             </a:fld>
             <a:endParaRPr lang="en-US"/>
           </a:p>
@@ -887,7 +888,7 @@
           <a:p>
             <a:fld id="{6BC3A7F1-B9CE-4598-BAFD-9A6560ED0FF1}" type="datetimeFigureOut">
               <a:rPr lang="en-US" smtClean="0"/>
-              <a:t>1/3/2020</a:t>
+              <a:t>1/31/2022</a:t>
             </a:fld>
             <a:endParaRPr lang="en-US"/>
           </a:p>
@@ -1162,7 +1163,7 @@
           <a:p>
             <a:fld id="{6BC3A7F1-B9CE-4598-BAFD-9A6560ED0FF1}" type="datetimeFigureOut">
               <a:rPr lang="en-US" smtClean="0"/>
-              <a:t>1/3/2020</a:t>
+              <a:t>1/31/2022</a:t>
             </a:fld>
             <a:endParaRPr lang="en-US"/>
           </a:p>
@@ -1427,7 +1428,7 @@
           <a:p>
             <a:fld id="{6BC3A7F1-B9CE-4598-BAFD-9A6560ED0FF1}" type="datetimeFigureOut">
               <a:rPr lang="en-US" smtClean="0"/>
-              <a:t>1/3/2020</a:t>
+              <a:t>1/31/2022</a:t>
             </a:fld>
             <a:endParaRPr lang="en-US"/>
           </a:p>
@@ -1839,7 +1840,7 @@
           <a:p>
             <a:fld id="{6BC3A7F1-B9CE-4598-BAFD-9A6560ED0FF1}" type="datetimeFigureOut">
               <a:rPr lang="en-US" smtClean="0"/>
-              <a:t>1/3/2020</a:t>
+              <a:t>1/31/2022</a:t>
             </a:fld>
             <a:endParaRPr lang="en-US"/>
           </a:p>
@@ -1980,7 +1981,7 @@
           <a:p>
             <a:fld id="{6BC3A7F1-B9CE-4598-BAFD-9A6560ED0FF1}" type="datetimeFigureOut">
               <a:rPr lang="en-US" smtClean="0"/>
-              <a:t>1/3/2020</a:t>
+              <a:t>1/31/2022</a:t>
             </a:fld>
             <a:endParaRPr lang="en-US"/>
           </a:p>
@@ -2093,7 +2094,7 @@
           <a:p>
             <a:fld id="{6BC3A7F1-B9CE-4598-BAFD-9A6560ED0FF1}" type="datetimeFigureOut">
               <a:rPr lang="en-US" smtClean="0"/>
-              <a:t>1/3/2020</a:t>
+              <a:t>1/31/2022</a:t>
             </a:fld>
             <a:endParaRPr lang="en-US"/>
           </a:p>
@@ -2404,7 +2405,7 @@
           <a:p>
             <a:fld id="{6BC3A7F1-B9CE-4598-BAFD-9A6560ED0FF1}" type="datetimeFigureOut">
               <a:rPr lang="en-US" smtClean="0"/>
-              <a:t>1/3/2020</a:t>
+              <a:t>1/31/2022</a:t>
             </a:fld>
             <a:endParaRPr lang="en-US"/>
           </a:p>
@@ -2692,7 +2693,7 @@
           <a:p>
             <a:fld id="{6BC3A7F1-B9CE-4598-BAFD-9A6560ED0FF1}" type="datetimeFigureOut">
               <a:rPr lang="en-US" smtClean="0"/>
-              <a:t>1/3/2020</a:t>
+              <a:t>1/31/2022</a:t>
             </a:fld>
             <a:endParaRPr lang="en-US"/>
           </a:p>
@@ -2933,7 +2934,7 @@
           <a:p>
             <a:fld id="{6BC3A7F1-B9CE-4598-BAFD-9A6560ED0FF1}" type="datetimeFigureOut">
               <a:rPr lang="en-US" smtClean="0"/>
-              <a:t>1/3/2020</a:t>
+              <a:t>1/31/2022</a:t>
             </a:fld>
             <a:endParaRPr lang="en-US"/>
           </a:p>
@@ -5247,6 +5248,204 @@
     <p:extLst>
       <p:ext uri="{BB962C8B-B14F-4D97-AF65-F5344CB8AC3E}">
         <p14:creationId xmlns:p14="http://schemas.microsoft.com/office/powerpoint/2010/main" val="3019572994"/>
+      </p:ext>
+    </p:extLst>
+  </p:cSld>
+  <p:clrMapOvr>
+    <a:masterClrMapping/>
+  </p:clrMapOvr>
+</p:sld>
+</file>
+
+<file path=ppt/slides/slide15.xml><?xml version="1.0" encoding="utf-8"?>
+<p:sld xmlns:a="http://schemas.openxmlformats.org/drawingml/2006/main" xmlns:r="http://schemas.openxmlformats.org/officeDocument/2006/relationships" xmlns:p="http://schemas.openxmlformats.org/presentationml/2006/main">
+  <p:cSld>
+    <p:spTree>
+      <p:nvGrpSpPr>
+        <p:cNvPr id="1" name=""/>
+        <p:cNvGrpSpPr/>
+        <p:nvPr/>
+      </p:nvGrpSpPr>
+      <p:grpSpPr>
+        <a:xfrm>
+          <a:off x="0" y="0"/>
+          <a:ext cx="0" cy="0"/>
+          <a:chOff x="0" y="0"/>
+          <a:chExt cx="0" cy="0"/>
+        </a:xfrm>
+      </p:grpSpPr>
+      <p:sp>
+        <p:nvSpPr>
+          <p:cNvPr id="2" name="TextBox 1">
+            <a:extLst>
+              <a:ext uri="{FF2B5EF4-FFF2-40B4-BE49-F238E27FC236}">
+                <a16:creationId xmlns:a16="http://schemas.microsoft.com/office/drawing/2014/main" id="{B2B491FF-EDC8-46D3-8136-C64E390C4B9F}"/>
+              </a:ext>
+            </a:extLst>
+          </p:cNvPr>
+          <p:cNvSpPr txBox="1"/>
+          <p:nvPr/>
+        </p:nvSpPr>
+        <p:spPr>
+          <a:xfrm>
+            <a:off x="3022749" y="1347077"/>
+            <a:ext cx="3688770" cy="1015663"/>
+          </a:xfrm>
+          <a:prstGeom prst="rect">
+            <a:avLst/>
+          </a:prstGeom>
+          <a:noFill/>
+        </p:spPr>
+        <p:txBody>
+          <a:bodyPr wrap="square" rtlCol="0">
+            <a:spAutoFit/>
+          </a:bodyPr>
+          <a:lstStyle/>
+          <a:p>
+            <a:r>
+              <a:rPr lang="en-US" sz="6000" dirty="0">
+                <a:latin typeface="Lato Black" panose="020F0502020204030203" pitchFamily="34" charset="0"/>
+                <a:ea typeface="Lato Black" panose="020F0502020204030203" pitchFamily="34" charset="0"/>
+                <a:cs typeface="Lato Black" panose="020F0502020204030203" pitchFamily="34" charset="0"/>
+              </a:rPr>
+              <a:t>Made For </a:t>
+            </a:r>
+          </a:p>
+        </p:txBody>
+      </p:sp>
+      <p:sp>
+        <p:nvSpPr>
+          <p:cNvPr id="4" name="Rectangle 3">
+            <a:extLst>
+              <a:ext uri="{FF2B5EF4-FFF2-40B4-BE49-F238E27FC236}">
+                <a16:creationId xmlns:a16="http://schemas.microsoft.com/office/drawing/2014/main" id="{AB0716FF-C554-453D-9DCD-686A84D05FBF}"/>
+              </a:ext>
+            </a:extLst>
+          </p:cNvPr>
+          <p:cNvSpPr/>
+          <p:nvPr/>
+        </p:nvSpPr>
+        <p:spPr>
+          <a:xfrm>
+            <a:off x="0" y="2428240"/>
+            <a:ext cx="12192000" cy="1717040"/>
+          </a:xfrm>
+          <a:prstGeom prst="rect">
+            <a:avLst/>
+          </a:prstGeom>
+        </p:spPr>
+        <p:style>
+          <a:lnRef idx="2">
+            <a:schemeClr val="dk1">
+              <a:shade val="50000"/>
+            </a:schemeClr>
+          </a:lnRef>
+          <a:fillRef idx="1">
+            <a:schemeClr val="dk1"/>
+          </a:fillRef>
+          <a:effectRef idx="0">
+            <a:schemeClr val="dk1"/>
+          </a:effectRef>
+          <a:fontRef idx="minor">
+            <a:schemeClr val="lt1"/>
+          </a:fontRef>
+        </p:style>
+        <p:txBody>
+          <a:bodyPr rtlCol="0" anchor="ctr"/>
+          <a:lstStyle/>
+          <a:p>
+            <a:pPr algn="ctr"/>
+            <a:endParaRPr lang="en-US"/>
+          </a:p>
+        </p:txBody>
+      </p:sp>
+      <p:sp>
+        <p:nvSpPr>
+          <p:cNvPr id="5" name="TextBox 4">
+            <a:extLst>
+              <a:ext uri="{FF2B5EF4-FFF2-40B4-BE49-F238E27FC236}">
+                <a16:creationId xmlns:a16="http://schemas.microsoft.com/office/drawing/2014/main" id="{14A9BD91-11CA-407D-AFAE-9A1214BA3B33}"/>
+              </a:ext>
+            </a:extLst>
+          </p:cNvPr>
+          <p:cNvSpPr txBox="1"/>
+          <p:nvPr/>
+        </p:nvSpPr>
+        <p:spPr>
+          <a:xfrm>
+            <a:off x="3147036" y="2701181"/>
+            <a:ext cx="4766122" cy="923330"/>
+          </a:xfrm>
+          <a:prstGeom prst="rect">
+            <a:avLst/>
+          </a:prstGeom>
+          <a:noFill/>
+        </p:spPr>
+        <p:txBody>
+          <a:bodyPr wrap="square" rtlCol="0">
+            <a:spAutoFit/>
+          </a:bodyPr>
+          <a:lstStyle/>
+          <a:p>
+            <a:r>
+              <a:rPr lang="en-US" sz="5400" dirty="0" err="1">
+                <a:solidFill>
+                  <a:schemeClr val="bg1"/>
+                </a:solidFill>
+              </a:rPr>
+              <a:t>RoboSUST</a:t>
+            </a:r>
+            <a:endParaRPr lang="en-US" sz="5400" dirty="0">
+              <a:solidFill>
+                <a:schemeClr val="bg1"/>
+              </a:solidFill>
+            </a:endParaRPr>
+          </a:p>
+        </p:txBody>
+      </p:sp>
+      <p:sp>
+        <p:nvSpPr>
+          <p:cNvPr id="6" name="TextBox 5">
+            <a:extLst>
+              <a:ext uri="{FF2B5EF4-FFF2-40B4-BE49-F238E27FC236}">
+                <a16:creationId xmlns:a16="http://schemas.microsoft.com/office/drawing/2014/main" id="{56055A0D-FCA6-4F75-9E18-E084813CA08B}"/>
+              </a:ext>
+            </a:extLst>
+          </p:cNvPr>
+          <p:cNvSpPr txBox="1"/>
+          <p:nvPr/>
+        </p:nvSpPr>
+        <p:spPr>
+          <a:xfrm>
+            <a:off x="5101603" y="4500129"/>
+            <a:ext cx="3688770" cy="400110"/>
+          </a:xfrm>
+          <a:prstGeom prst="rect">
+            <a:avLst/>
+          </a:prstGeom>
+          <a:noFill/>
+        </p:spPr>
+        <p:txBody>
+          <a:bodyPr wrap="square" rtlCol="0">
+            <a:spAutoFit/>
+          </a:bodyPr>
+          <a:lstStyle/>
+          <a:p>
+            <a:r>
+              <a:rPr lang="en-US" sz="2000" dirty="0">
+                <a:latin typeface="Lato Black" panose="020F0502020204030203" pitchFamily="34" charset="0"/>
+                <a:ea typeface="Lato Black" panose="020F0502020204030203" pitchFamily="34" charset="0"/>
+                <a:cs typeface="Lato Black" panose="020F0502020204030203" pitchFamily="34" charset="0"/>
+              </a:rPr>
+              <a:t>Created By : Mirza Nihal Baig</a:t>
+            </a:r>
+          </a:p>
+        </p:txBody>
+      </p:sp>
+    </p:spTree>
+    <p:extLst>
+      <p:ext uri="{BB962C8B-B14F-4D97-AF65-F5344CB8AC3E}">
+        <p14:creationId xmlns:p14="http://schemas.microsoft.com/office/powerpoint/2010/main" val="1938258166"/>
       </p:ext>
     </p:extLst>
   </p:cSld>

</xml_diff>